<commit_message>
v.1.0.2: Default font Arial, custom slide guides
- Changed default fonts from Calibri to Arial (theme and charts)
- Added custom slide guides for consistent layouts
- Updated text styles in slide master
</commit_message>
<xml_diff>
--- a/node-test-output.pptx
+++ b/node-test-output.pptx
@@ -1288,15 +1288,18 @@
   <p:sldLayoutIdLst>
     <p:sldLayoutId id="2147483649" r:id="rId1"/>
   </p:sldLayoutIdLst>
-  <p:hf sldNum="0" hdr="0" ftr="0" dt="0"/>
+  <p:hf hdr="0" ftr="0" dt="0"/>
   <p:txStyles>
     <p:titleStyle>
-      <a:lvl1pPr algn="ctr" defTabSz="914400" rtl="0" eaLnBrk="1" latinLnBrk="0" hangingPunct="1">
+      <a:lvl1pPr algn="l" defTabSz="914400" rtl="0" eaLnBrk="1" latinLnBrk="0" hangingPunct="1">
+        <a:lnSpc>
+          <a:spcPct val="90000"/>
+        </a:lnSpc>
         <a:spcBef>
           <a:spcPct val="0"/>
         </a:spcBef>
         <a:buNone/>
-        <a:defRPr sz="4400" kern="1200">
+        <a:defRPr sz="2400" kern="1200">
           <a:solidFill>
             <a:schemeClr val="tx1"/>
           </a:solidFill>
@@ -1307,13 +1310,19 @@
       </a:lvl1pPr>
     </p:titleStyle>
     <p:bodyStyle>
-      <a:lvl1pPr marL="342900" indent="-342900" algn="l" defTabSz="914400" rtl="0" eaLnBrk="1" latinLnBrk="0" hangingPunct="1">
+      <a:lvl1pPr marL="169863" indent="-169863" algn="l" defTabSz="914400" rtl="0" eaLnBrk="1" latinLnBrk="0" hangingPunct="1">
+        <a:lnSpc>
+          <a:spcPct val="100000"/>
+        </a:lnSpc>
         <a:spcBef>
-          <a:spcPct val="20000"/>
+          <a:spcPts val="0"/>
         </a:spcBef>
-        <a:buFont typeface="Arial" pitchFamily="34" charset="0"/>
+        <a:spcAft>
+          <a:spcPts val="600"/>
+        </a:spcAft>
+        <a:buFont typeface="Arial" panose="020B0604020202020204" pitchFamily="34" charset="0"/>
         <a:buChar char="•"/>
-        <a:defRPr sz="3200" kern="1200">
+        <a:defRPr sz="1600" kern="1200">
           <a:solidFill>
             <a:schemeClr val="tx1"/>
           </a:solidFill>
@@ -1322,13 +1331,19 @@
           <a:cs typeface="+mn-cs"/>
         </a:defRPr>
       </a:lvl1pPr>
-      <a:lvl2pPr marL="742950" indent="-285750" algn="l" defTabSz="914400" rtl="0" eaLnBrk="1" latinLnBrk="0" hangingPunct="1">
+      <a:lvl2pPr marL="341313" indent="-171450" algn="l" defTabSz="914400" rtl="0" eaLnBrk="1" latinLnBrk="0" hangingPunct="1">
+        <a:lnSpc>
+          <a:spcPct val="100000"/>
+        </a:lnSpc>
         <a:spcBef>
-          <a:spcPct val="20000"/>
+          <a:spcPts val="0"/>
         </a:spcBef>
-        <a:buFont typeface="Arial" pitchFamily="34" charset="0"/>
+        <a:spcAft>
+          <a:spcPts val="600"/>
+        </a:spcAft>
+        <a:buFont typeface="Arial" panose="020B0604020202020204" pitchFamily="34" charset="0"/>
         <a:buChar char="–"/>
-        <a:defRPr sz="2800" kern="1200">
+        <a:defRPr sz="1400" kern="1200">
           <a:solidFill>
             <a:schemeClr val="tx1"/>
           </a:solidFill>
@@ -1337,13 +1352,20 @@
           <a:cs typeface="+mn-cs"/>
         </a:defRPr>
       </a:lvl2pPr>
-      <a:lvl3pPr marL="1143000" indent="-228600" algn="l" defTabSz="914400" rtl="0" eaLnBrk="1" latinLnBrk="0" hangingPunct="1">
+      <a:lvl3pPr marL="517525" indent="-176213" algn="l" defTabSz="914400" rtl="0" eaLnBrk="1" latinLnBrk="0" hangingPunct="1">
+        <a:lnSpc>
+          <a:spcPct val="100000"/>
+        </a:lnSpc>
         <a:spcBef>
-          <a:spcPct val="20000"/>
+          <a:spcPts val="0"/>
         </a:spcBef>
-        <a:buFont typeface="Arial" pitchFamily="34" charset="0"/>
+        <a:spcAft>
+          <a:spcPts val="600"/>
+        </a:spcAft>
+        <a:buFont typeface="Arial" panose="020B0604020202020204" pitchFamily="34" charset="0"/>
         <a:buChar char="•"/>
-        <a:defRPr sz="2400" kern="1200">
+        <a:tabLst/>
+        <a:defRPr sz="1200" kern="1200">
           <a:solidFill>
             <a:schemeClr val="tx1"/>
           </a:solidFill>
@@ -1352,13 +1374,19 @@
           <a:cs typeface="+mn-cs"/>
         </a:defRPr>
       </a:lvl3pPr>
-      <a:lvl4pPr marL="1600200" indent="-228600" algn="l" defTabSz="914400" rtl="0" eaLnBrk="1" latinLnBrk="0" hangingPunct="1">
+      <a:lvl4pPr marL="687388" indent="-169863" algn="l" defTabSz="914400" rtl="0" eaLnBrk="1" latinLnBrk="0" hangingPunct="1">
+        <a:lnSpc>
+          <a:spcPct val="100000"/>
+        </a:lnSpc>
         <a:spcBef>
-          <a:spcPct val="20000"/>
+          <a:spcPts val="0"/>
         </a:spcBef>
-        <a:buFont typeface="Arial" pitchFamily="34" charset="0"/>
+        <a:spcAft>
+          <a:spcPts val="600"/>
+        </a:spcAft>
+        <a:buFont typeface="Arial" panose="020B0604020202020204" pitchFamily="34" charset="0"/>
         <a:buChar char="–"/>
-        <a:defRPr sz="2000" kern="1200">
+        <a:defRPr sz="1050" kern="1200">
           <a:solidFill>
             <a:schemeClr val="tx1"/>
           </a:solidFill>
@@ -1367,13 +1395,19 @@
           <a:cs typeface="+mn-cs"/>
         </a:defRPr>
       </a:lvl4pPr>
-      <a:lvl5pPr marL="2057400" indent="-228600" algn="l" defTabSz="914400" rtl="0" eaLnBrk="1" latinLnBrk="0" hangingPunct="1">
+      <a:lvl5pPr marL="914400" indent="-227013" algn="l" defTabSz="914400" rtl="0" eaLnBrk="1" latinLnBrk="0" hangingPunct="1">
+        <a:lnSpc>
+          <a:spcPct val="100000"/>
+        </a:lnSpc>
         <a:spcBef>
-          <a:spcPct val="20000"/>
+          <a:spcPts val="0"/>
         </a:spcBef>
-        <a:buFont typeface="Arial" pitchFamily="34" charset="0"/>
-        <a:buChar char="»"/>
-        <a:defRPr sz="2000" kern="1200">
+        <a:spcAft>
+          <a:spcPts val="600"/>
+        </a:spcAft>
+        <a:buFont typeface="Arial" panose="020B0604020202020204" pitchFamily="34" charset="0"/>
+        <a:buChar char="•"/>
+        <a:defRPr sz="1050" kern="1200">
           <a:solidFill>
             <a:schemeClr val="tx1"/>
           </a:solidFill>
@@ -1383,12 +1417,15 @@
         </a:defRPr>
       </a:lvl5pPr>
       <a:lvl6pPr marL="2514600" indent="-228600" algn="l" defTabSz="914400" rtl="0" eaLnBrk="1" latinLnBrk="0" hangingPunct="1">
+        <a:lnSpc>
+          <a:spcPct val="90000"/>
+        </a:lnSpc>
         <a:spcBef>
-          <a:spcPct val="20000"/>
+          <a:spcPts val="500"/>
         </a:spcBef>
-        <a:buFont typeface="Arial" pitchFamily="34" charset="0"/>
+        <a:buFont typeface="Arial" panose="020B0604020202020204" pitchFamily="34" charset="0"/>
         <a:buChar char="•"/>
-        <a:defRPr sz="2000" kern="1200">
+        <a:defRPr sz="1800" kern="1200">
           <a:solidFill>
             <a:schemeClr val="tx1"/>
           </a:solidFill>
@@ -1398,12 +1435,15 @@
         </a:defRPr>
       </a:lvl6pPr>
       <a:lvl7pPr marL="2971800" indent="-228600" algn="l" defTabSz="914400" rtl="0" eaLnBrk="1" latinLnBrk="0" hangingPunct="1">
+        <a:lnSpc>
+          <a:spcPct val="90000"/>
+        </a:lnSpc>
         <a:spcBef>
-          <a:spcPct val="20000"/>
+          <a:spcPts val="500"/>
         </a:spcBef>
-        <a:buFont typeface="Arial" pitchFamily="34" charset="0"/>
+        <a:buFont typeface="Arial" panose="020B0604020202020204" pitchFamily="34" charset="0"/>
         <a:buChar char="•"/>
-        <a:defRPr sz="2000" kern="1200">
+        <a:defRPr sz="1800" kern="1200">
           <a:solidFill>
             <a:schemeClr val="tx1"/>
           </a:solidFill>
@@ -1413,12 +1453,15 @@
         </a:defRPr>
       </a:lvl7pPr>
       <a:lvl8pPr marL="3429000" indent="-228600" algn="l" defTabSz="914400" rtl="0" eaLnBrk="1" latinLnBrk="0" hangingPunct="1">
+        <a:lnSpc>
+          <a:spcPct val="90000"/>
+        </a:lnSpc>
         <a:spcBef>
-          <a:spcPct val="20000"/>
+          <a:spcPts val="500"/>
         </a:spcBef>
-        <a:buFont typeface="Arial" pitchFamily="34" charset="0"/>
+        <a:buFont typeface="Arial" panose="020B0604020202020204" pitchFamily="34" charset="0"/>
         <a:buChar char="•"/>
-        <a:defRPr sz="2000" kern="1200">
+        <a:defRPr sz="1800" kern="1200">
           <a:solidFill>
             <a:schemeClr val="tx1"/>
           </a:solidFill>
@@ -1428,12 +1471,15 @@
         </a:defRPr>
       </a:lvl8pPr>
       <a:lvl9pPr marL="3886200" indent="-228600" algn="l" defTabSz="914400" rtl="0" eaLnBrk="1" latinLnBrk="0" hangingPunct="1">
+        <a:lnSpc>
+          <a:spcPct val="90000"/>
+        </a:lnSpc>
         <a:spcBef>
-          <a:spcPct val="20000"/>
+          <a:spcPts val="500"/>
         </a:spcBef>
-        <a:buFont typeface="Arial" pitchFamily="34" charset="0"/>
+        <a:buFont typeface="Arial" panose="020B0604020202020204" pitchFamily="34" charset="0"/>
         <a:buChar char="•"/>
-        <a:defRPr sz="2000" kern="1200">
+        <a:defRPr sz="1800" kern="1200">
           <a:solidFill>
             <a:schemeClr val="tx1"/>
           </a:solidFill>
@@ -1539,6 +1585,37 @@
       </a:lvl9pPr>
     </p:otherStyle>
   </p:txStyles>
+  <p:extLst>
+    <p:ext uri="{27BBF7A9-308A-43DC-89C8-2F10F3537804}">
+      <p15:sldGuideLst xmlns:p15="http://schemas.microsoft.com/office/powerpoint/2012/main">
+        <p15:guide id="5" pos="3840" userDrawn="1">
+          <p15:clr>
+            <a:srgbClr val="A4A3A4"/>
+          </p15:clr>
+        </p15:guide>
+        <p15:guide id="6" pos="7329" userDrawn="1">
+          <p15:clr>
+            <a:srgbClr val="F26B43"/>
+          </p15:clr>
+        </p15:guide>
+        <p15:guide id="9" orient="horz" pos="216" userDrawn="1">
+          <p15:clr>
+            <a:srgbClr val="F26B43"/>
+          </p15:clr>
+        </p15:guide>
+        <p15:guide id="12" orient="horz" pos="3912" userDrawn="1">
+          <p15:clr>
+            <a:srgbClr val="F26B43"/>
+          </p15:clr>
+        </p15:guide>
+        <p15:guide id="21" pos="351" userDrawn="1">
+          <p15:clr>
+            <a:srgbClr val="F26B43"/>
+          </p15:clr>
+        </p15:guide>
+      </p15:sldGuideLst>
+    </p:ext>
+  </p:extLst>
 </p:sldMaster>
 </file>
 
@@ -2427,7 +2504,7 @@
     </a:clrScheme>
     <a:fontScheme name="SP Global Font Theme">
       <a:majorFont>
-        <a:latin typeface="Calibri Light" panose="020F0302020204030204"/>
+        <a:latin typeface="Arial" panose="020F0302020204030204"/>
         <a:ea typeface=""/>
         <a:cs typeface=""/>
         <a:font script="Jpan" typeface="游ゴシック Light"/>
@@ -2479,7 +2556,7 @@
         <a:font script="Tfng" typeface="Ebrima"/>
       </a:majorFont>
       <a:minorFont>
-        <a:latin typeface="Calibri" panose="020F0502020204030204"/>
+        <a:latin typeface="Arial" panose="020F0502020204030204"/>
         <a:ea typeface=""/>
         <a:cs typeface=""/>
         <a:font script="Jpan" typeface="游ゴシック"/>

</xml_diff>

<commit_message>
v.1.0.3: Custom slide layout with zero inset margins
- Added 'Content - no subtitle' slide layout (slideLayout1.xml)
- All placeholder bodyPr elements have lIns=0 tIns=0 rIns=0 bIns=0
- Includes Footer, Slide Number, Title, Content, and Footnote placeholders
- Updated genXmlBodyProperties() default to use zero margins
</commit_message>
<xml_diff>
--- a/node-test-output.pptx
+++ b/node-test-output.pptx
@@ -2,7 +2,7 @@
 <file path=ppt/presentation.xml><?xml version="1.0" encoding="utf-8"?>
 <p:presentation xmlns:a="http://schemas.openxmlformats.org/drawingml/2006/main" xmlns:r="http://schemas.openxmlformats.org/officeDocument/2006/relationships" xmlns:p="http://schemas.openxmlformats.org/presentationml/2006/main" saveSubsetFonts="1" autoCompressPictures="0">
   <p:sldMasterIdLst>
-    <p:sldMasterId id="2147483648" r:id="rId1"/>
+    <p:sldMasterId id="2147483757" r:id="rId1"/>
   </p:sldMasterIdLst>
   <p:sldIdLst>
     <p:sldId id="256" r:id="rId2"/>
@@ -1236,8 +1236,262 @@
 </file>
 
 <file path=ppt/slideLayouts/slideLayout1.xml><?xml version="1.0" encoding="utf-8"?>
-<p:sldLayout xmlns:a="http://schemas.openxmlformats.org/drawingml/2006/main" xmlns:r="http://schemas.openxmlformats.org/officeDocument/2006/relationships" xmlns:p="http://schemas.openxmlformats.org/presentationml/2006/main" preserve="1">
-  <p:cSld name="S-P Global EDP 2026 16-9">
+<p:sldLayout xmlns:a="http://schemas.openxmlformats.org/drawingml/2006/main" xmlns:r="http://schemas.openxmlformats.org/officeDocument/2006/relationships" xmlns:p="http://schemas.openxmlformats.org/presentationml/2006/main" preserve="1" userDrawn="1">
+  <p:cSld name="Content - no subtitle">
+    <p:spTree>
+      <p:nvGrpSpPr>
+        <p:cNvPr id="1" name=""/>
+        <p:cNvGrpSpPr/>
+        <p:nvPr/>
+      </p:nvGrpSpPr>
+      <p:grpSpPr>
+        <a:xfrm>
+          <a:off x="0" y="0"/>
+          <a:ext cx="0" cy="0"/>
+          <a:chOff x="0" y="0"/>
+          <a:chExt cx="0" cy="0"/>
+        </a:xfrm>
+      </p:grpSpPr>
+      <p:sp>
+        <p:nvSpPr>
+          <p:cNvPr id="2" name="Footer Placeholder 1"/>
+          <p:cNvSpPr>
+            <a:spLocks noGrp="1"/>
+          </p:cNvSpPr>
+          <p:nvPr>
+            <p:ph type="ftr" sz="quarter" idx="18"/>
+          </p:nvPr>
+        </p:nvSpPr>
+        <p:spPr/>
+        <p:txBody>
+          <a:bodyPr lIns="0" tIns="0" rIns="0" bIns="0"/>
+          <a:lstStyle/>
+          <a:p>
+            <a:r>
+              <a:rPr lang="en-US"/>
+              <a:t>Section name (optional) / Title / Month 20YY</a:t>
+            </a:r>
+          </a:p>
+        </p:txBody>
+      </p:sp>
+      <p:sp>
+        <p:nvSpPr>
+          <p:cNvPr id="6" name="Slide Number Placeholder 5"/>
+          <p:cNvSpPr>
+            <a:spLocks noGrp="1"/>
+          </p:cNvSpPr>
+          <p:nvPr>
+            <p:ph type="sldNum" sz="quarter" idx="12"/>
+          </p:nvPr>
+        </p:nvSpPr>
+        <p:spPr/>
+        <p:txBody>
+          <a:bodyPr lIns="0" tIns="0" rIns="0" bIns="0"/>
+          <a:lstStyle/>
+          <a:p>
+            <a:fld id="{5246FB18-5DF1-419A-B975-14AFDDD65B9F}" type="slidenum">
+              <a:rPr lang="en-US" smtClean="0"/>
+              <a:t>‹#›</a:t>
+            </a:fld>
+            <a:endParaRPr lang="en-US"/>
+          </a:p>
+        </p:txBody>
+      </p:sp>
+      <p:sp>
+        <p:nvSpPr>
+          <p:cNvPr id="9" name="Title 6"/>
+          <p:cNvSpPr>
+            <a:spLocks noGrp="1"/>
+          </p:cNvSpPr>
+          <p:nvPr>
+            <p:ph type="title" hasCustomPrompt="1"/>
+          </p:nvPr>
+        </p:nvSpPr>
+        <p:spPr>
+          <a:xfrm>
+            <a:off x="567040" y="347472"/>
+            <a:ext cx="11060912" cy="826477"/>
+          </a:xfrm>
+        </p:spPr>
+        <p:txBody>
+          <a:bodyPr lIns="0" tIns="0" rIns="0" bIns="0"/>
+          <a:lstStyle/>
+          <a:p>
+            <a:r>
+              <a:rPr lang="en-US"/>
+              <a:t>[Headline]</a:t>
+            </a:r>
+          </a:p>
+        </p:txBody>
+      </p:sp>
+      <p:sp>
+        <p:nvSpPr>
+          <p:cNvPr id="3" name="Content Placeholder 2"/>
+          <p:cNvSpPr>
+            <a:spLocks noGrp="1"/>
+          </p:cNvSpPr>
+          <p:nvPr>
+            <p:ph sz="quarter" idx="17" hasCustomPrompt="1"/>
+          </p:nvPr>
+        </p:nvSpPr>
+        <p:spPr>
+          <a:xfrm>
+            <a:off x="567037" y="1257300"/>
+            <a:ext cx="11064240" cy="4343400"/>
+          </a:xfrm>
+        </p:spPr>
+        <p:txBody>
+          <a:bodyPr lIns="0" tIns="0" rIns="0" bIns="0"/>
+          <a:lstStyle/>
+          <a:p>
+            <a:pPr lvl="0"/>
+            <a:r>
+              <a:rPr kumimoji="0" lang="en-US" sz="1600" b="0" i="0" u="none" strike="noStrike" kern="1200" cap="none" spc="0" normalizeH="0" baseline="0" noProof="0">
+                <a:ln>
+                  <a:noFill/>
+                </a:ln>
+                <a:solidFill>
+                  <a:srgbClr val="000000"/>
+                </a:solidFill>
+                <a:effectLst/>
+                <a:uLnTx/>
+                <a:uFillTx/>
+                <a:latin typeface="Arial"/>
+                <a:ea typeface="+mn-ea"/>
+                <a:cs typeface="+mn-cs"/>
+              </a:rPr>
+              <a:t>[Click to add content]</a:t>
+            </a:r>
+            <a:endParaRPr lang="en-US"/>
+          </a:p>
+          <a:p>
+            <a:pPr lvl="1"/>
+            <a:r>
+              <a:rPr lang="en-US"/>
+              <a:t>Second level</a:t>
+            </a:r>
+          </a:p>
+          <a:p>
+            <a:pPr lvl="2"/>
+            <a:r>
+              <a:rPr lang="en-US"/>
+              <a:t>Third level</a:t>
+            </a:r>
+          </a:p>
+          <a:p>
+            <a:pPr lvl="3"/>
+            <a:r>
+              <a:rPr lang="en-US"/>
+              <a:t>Fourth level</a:t>
+            </a:r>
+          </a:p>
+          <a:p>
+            <a:pPr lvl="4"/>
+            <a:r>
+              <a:rPr lang="en-US"/>
+              <a:t>Fifth level</a:t>
+            </a:r>
+          </a:p>
+        </p:txBody>
+      </p:sp>
+      <p:sp>
+        <p:nvSpPr>
+          <p:cNvPr id="8" name="Footnote"/>
+          <p:cNvSpPr>
+            <a:spLocks noGrp="1"/>
+          </p:cNvSpPr>
+          <p:nvPr>
+            <p:ph type="body" sz="quarter" idx="15" hasCustomPrompt="1"/>
+          </p:nvPr>
+        </p:nvSpPr>
+        <p:spPr>
+          <a:xfrm>
+            <a:off x="567039" y="5687045"/>
+            <a:ext cx="11060912" cy="525368"/>
+          </a:xfrm>
+          <a:prstGeom prst="rect">
+            <a:avLst/>
+          </a:prstGeom>
+        </p:spPr>
+        <p:txBody>
+          <a:bodyPr lIns="0" tIns="0" rIns="0" bIns="0" anchor="b"/>
+          <a:lstStyle>
+            <a:lvl1pPr marL="0" indent="0">
+              <a:lnSpc>
+                <a:spcPct val="100000"/>
+              </a:lnSpc>
+              <a:spcBef>
+                <a:spcPts val="0"/>
+              </a:spcBef>
+              <a:spcAft>
+                <a:spcPts val="200"/>
+              </a:spcAft>
+              <a:buSzPct val="25000"/>
+              <a:buFont typeface="Arial" panose="020B0604020202020204" pitchFamily="34" charset="0"/>
+              <a:buNone/>
+              <a:defRPr sz="700">
+                <a:latin typeface="+mn-lt"/>
+              </a:defRPr>
+            </a:lvl1pPr>
+            <a:lvl2pPr marL="169863" indent="-112713">
+              <a:lnSpc>
+                <a:spcPct val="70000"/>
+              </a:lnSpc>
+              <a:spcBef>
+                <a:spcPts val="0"/>
+              </a:spcBef>
+              <a:buFont typeface="Arial" panose="020B0604020202020204" pitchFamily="34" charset="0"/>
+              <a:buChar char="•"/>
+              <a:defRPr sz="700">
+                <a:latin typeface="+mn-lt"/>
+              </a:defRPr>
+            </a:lvl2pPr>
+            <a:lvl3pPr marL="341312" indent="0">
+              <a:buNone/>
+              <a:defRPr/>
+            </a:lvl3pPr>
+          </a:lstStyle>
+          <a:p>
+            <a:pPr lvl="0"/>
+            <a:r>
+              <a:rPr lang="en-US"/>
+              <a:t>[Source / Legal disclaimer / Footnote]</a:t>
+            </a:r>
+          </a:p>
+        </p:txBody>
+      </p:sp>
+    </p:spTree>
+    <p:extLst>
+      <p:ext uri="{BB962C8B-B14F-4D97-AF65-F5344CB8AC3E}">
+        <p14:creationId xmlns:p14="http://schemas.microsoft.com/office/powerpoint/2010/main" val="284192476"/>
+      </p:ext>
+    </p:extLst>
+  </p:cSld>
+  <p:clrMapOvr>
+    <a:masterClrMapping/>
+  </p:clrMapOvr>
+  <p:extLst>
+    <p:ext uri="{DCECCB84-F9BA-43D5-87BE-67443E8EF086}">
+      <p15:sldGuideLst xmlns:p15="http://schemas.microsoft.com/office/powerpoint/2012/main">
+        <p15:guide id="1" orient="horz" pos="792" userDrawn="1">
+          <p15:clr>
+            <a:srgbClr val="FBAE40"/>
+          </p15:clr>
+        </p15:guide>
+        <p15:guide id="2" orient="horz" pos="3528" userDrawn="1">
+          <p15:clr>
+            <a:srgbClr val="FBAE40"/>
+          </p15:clr>
+        </p15:guide>
+      </p15:sldGuideLst>
+    </p:ext>
+  </p:extLst>
+</p:sldLayout>
+</file>
+
+<file path=ppt/slideMasters/slideMaster1.xml><?xml version="1.0" encoding="utf-8"?>
+<p:sldMaster xmlns:a="http://schemas.openxmlformats.org/drawingml/2006/main" xmlns:r="http://schemas.openxmlformats.org/officeDocument/2006/relationships" xmlns:p="http://schemas.openxmlformats.org/presentationml/2006/main">
+  <p:cSld>
     <p:bg>
       <p:bgRef idx="1001">
         <a:schemeClr val="bg1"/>
@@ -1257,32 +1511,226 @@
           <a:chExt cx="0" cy="0"/>
         </a:xfrm>
       </p:grpSpPr>
+      <p:sp>
+        <p:nvSpPr>
+          <p:cNvPr id="2" name="Footer Placeholder 1">
+            <a:extLst>
+              <a:ext uri="{FF2B5EF4-FFF2-40B4-BE49-F238E27FC236}">
+                <a16:creationId xmlns:a16="http://schemas.microsoft.com/office/drawing/2014/main" id="{DA160B2F-9375-4DE3-A5A0-161BE0A64385}"/>
+              </a:ext>
+            </a:extLst>
+          </p:cNvPr>
+          <p:cNvSpPr>
+            <a:spLocks noGrp="1"/>
+          </p:cNvSpPr>
+          <p:nvPr>
+            <p:ph type="ftr" sz="quarter" idx="3"/>
+          </p:nvPr>
+        </p:nvSpPr>
+        <p:spPr>
+          <a:xfrm>
+            <a:off x="6096000" y="0"/>
+            <a:ext cx="5535279" cy="317674"/>
+          </a:xfrm>
+          <a:prstGeom prst="rect">
+            <a:avLst/>
+          </a:prstGeom>
+        </p:spPr>
+        <p:txBody>
+          <a:bodyPr vert="horz" wrap="none" lIns="0" tIns="0" rIns="0" bIns="0" rtlCol="0" anchor="ctr"/>
+          <a:lstStyle>
+            <a:lvl1pPr algn="r">
+              <a:defRPr sz="900">
+                <a:solidFill>
+                  <a:schemeClr val="tx1"/>
+                </a:solidFill>
+              </a:defRPr>
+            </a:lvl1pPr>
+          </a:lstStyle>
+          <a:p>
+            <a:r>
+              <a:rPr lang="en-US"/>
+              <a:t>Section name (optional) / Title / Month 20YY</a:t>
+            </a:r>
+          </a:p>
+        </p:txBody>
+      </p:sp>
+      <p:sp>
+        <p:nvSpPr>
+          <p:cNvPr id="6" name="Slide Number Placeholder 5"/>
+          <p:cNvSpPr>
+            <a:spLocks noGrp="1"/>
+          </p:cNvSpPr>
+          <p:nvPr userDrawn="1">
+            <p:ph type="sldNum" sz="quarter" idx="4"/>
+          </p:nvPr>
+        </p:nvSpPr>
+        <p:spPr>
+          <a:xfrm>
+            <a:off x="11320251" y="6563709"/>
+            <a:ext cx="311576" cy="214804"/>
+          </a:xfrm>
+          <a:prstGeom prst="rect">
+            <a:avLst/>
+          </a:prstGeom>
+        </p:spPr>
+        <p:txBody>
+          <a:bodyPr vert="horz" lIns="0" tIns="0" rIns="0" bIns="0" rtlCol="0" anchor="ctr"/>
+          <a:lstStyle>
+            <a:lvl1pPr algn="r">
+              <a:defRPr sz="700">
+                <a:solidFill>
+                  <a:schemeClr val="tx1"/>
+                </a:solidFill>
+              </a:defRPr>
+            </a:lvl1pPr>
+          </a:lstStyle>
+          <a:p>
+            <a:fld id="{5CFA18E4-D58E-4B28-B105-28D9665A8EBC}" type="slidenum">
+              <a:rPr lang="en-US" smtClean="0"/>
+              <a:pPr/>
+              <a:t>‹#›</a:t>
+            </a:fld>
+            <a:endParaRPr lang="en-US"/>
+          </a:p>
+        </p:txBody>
+      </p:sp>
+      <p:sp>
+        <p:nvSpPr>
+          <p:cNvPr id="88" name="Title Placeholder 1">
+            <a:extLst>
+              <a:ext uri="{FF2B5EF4-FFF2-40B4-BE49-F238E27FC236}">
+                <a16:creationId xmlns:a16="http://schemas.microsoft.com/office/drawing/2014/main" id="{92E3486A-297A-4953-BF79-0AEFDE6C9C3F}"/>
+              </a:ext>
+            </a:extLst>
+          </p:cNvPr>
+          <p:cNvSpPr>
+            <a:spLocks noGrp="1"/>
+          </p:cNvSpPr>
+          <p:nvPr userDrawn="1">
+            <p:ph type="title"/>
+          </p:nvPr>
+        </p:nvSpPr>
+        <p:spPr>
+          <a:xfrm>
+            <a:off x="567039" y="323644"/>
+            <a:ext cx="11062709" cy="845439"/>
+          </a:xfrm>
+          <a:prstGeom prst="rect">
+            <a:avLst/>
+          </a:prstGeom>
+        </p:spPr>
+        <p:txBody>
+          <a:bodyPr vert="horz" lIns="0" tIns="0" rIns="0" bIns="0" rtlCol="0" anchor="t">
+            <a:noAutofit/>
+          </a:bodyPr>
+          <a:lstStyle/>
+          <a:p>
+            <a:r>
+              <a:rPr lang="en-US"/>
+              <a:t>Click to edit Master title style</a:t>
+            </a:r>
+          </a:p>
+        </p:txBody>
+      </p:sp>
+      <p:sp>
+        <p:nvSpPr>
+          <p:cNvPr id="27" name="Text Placeholder 2">
+            <a:extLst>
+              <a:ext uri="{FF2B5EF4-FFF2-40B4-BE49-F238E27FC236}">
+                <a16:creationId xmlns:a16="http://schemas.microsoft.com/office/drawing/2014/main" id="{F08B5A9E-5A85-46D7-B45C-7C4E83238E02}"/>
+              </a:ext>
+            </a:extLst>
+          </p:cNvPr>
+          <p:cNvSpPr>
+            <a:spLocks noGrp="1"/>
+          </p:cNvSpPr>
+          <p:nvPr userDrawn="1">
+            <p:ph type="body" idx="1"/>
+          </p:nvPr>
+        </p:nvSpPr>
+        <p:spPr>
+          <a:xfrm>
+            <a:off x="567039" y="1289097"/>
+            <a:ext cx="11064240" cy="4261397"/>
+          </a:xfrm>
+          <a:prstGeom prst="rect">
+            <a:avLst/>
+          </a:prstGeom>
+        </p:spPr>
+        <p:txBody>
+          <a:bodyPr vert="horz" lIns="0" tIns="0" rIns="0" bIns="0" rtlCol="0">
+            <a:noAutofit/>
+          </a:bodyPr>
+          <a:lstStyle/>
+          <a:p>
+            <a:pPr lvl="0"/>
+            <a:r>
+              <a:rPr lang="en-US"/>
+              <a:t>Click to edit Master text styles</a:t>
+            </a:r>
+          </a:p>
+          <a:p>
+            <a:pPr lvl="1"/>
+            <a:r>
+              <a:rPr lang="en-US"/>
+              <a:t>Second level</a:t>
+            </a:r>
+          </a:p>
+          <a:p>
+            <a:pPr lvl="2"/>
+            <a:r>
+              <a:rPr lang="en-US"/>
+              <a:t>Third level</a:t>
+            </a:r>
+          </a:p>
+          <a:p>
+            <a:pPr lvl="3"/>
+            <a:r>
+              <a:rPr lang="en-US"/>
+              <a:t>Fourth level</a:t>
+            </a:r>
+          </a:p>
+          <a:p>
+            <a:pPr lvl="4"/>
+            <a:r>
+              <a:rPr lang="en-US"/>
+              <a:t>Fifth level</a:t>
+            </a:r>
+          </a:p>
+        </p:txBody>
+      </p:sp>
+      <p:sp>
+        <p:nvSpPr>
+          <p:cNvPr id="80" name="Rectangle 79">
+            <a:extLst>
+              <a:ext uri="{FF2B5EF4-FFF2-40B4-BE49-F238E27FC236}">
+                <a16:creationId xmlns:a16="http://schemas.microsoft.com/office/drawing/2014/main" id="{1284AB22-BA66-47B9-8BEB-416F2BFF4706}"/>
+              </a:ext>
+              <a:ext uri="{C183D7F6-B498-43B3-948B-1728B52AA6E4}">
+                <adec:decorative xmlns:adec="http://schemas.microsoft.com/office/drawing/2017/decorative" val="0"/>
+              </a:ext>
+            </a:extLst>
+          </p:cNvPr>
+          <p:cNvSpPr/>
+          <p:nvPr userDrawn="1"/>
+        </p:nvSpPr>
+        <p:spPr>
+          <a:xfrm>
+            <a:off x="5272088" y="6575649"/>
+            <a:ext cx="6129126" cy="200055"/>
+          </a:xfrm>
+          <a:prstGeom prst="rect">
+            <a:avLst/>
+          </a:prstGeom>
+        </p:spPr>
+      </p:sp>
     </p:spTree>
-  </p:cSld>
-  <p:clrMapOvr>
-    <a:masterClrMapping/>
-  </p:clrMapOvr>
-</p:sldLayout>
-</file>
-
-<file path=ppt/slideMasters/slideMaster1.xml><?xml version="1.0" encoding="utf-8"?>
-<p:sldMaster xmlns:a="http://schemas.openxmlformats.org/drawingml/2006/main" xmlns:r="http://schemas.openxmlformats.org/officeDocument/2006/relationships" xmlns:p="http://schemas.openxmlformats.org/presentationml/2006/main">
-  <p:cSld>
-    <p:spTree>
-      <p:nvGrpSpPr>
-        <p:cNvPr id="1" name=""/>
-        <p:cNvGrpSpPr/>
-        <p:nvPr/>
-      </p:nvGrpSpPr>
-      <p:grpSpPr>
-        <a:xfrm>
-          <a:off x="0" y="0"/>
-          <a:ext cx="0" cy="0"/>
-          <a:chOff x="0" y="0"/>
-          <a:chExt cx="0" cy="0"/>
-        </a:xfrm>
-      </p:grpSpPr>
-    </p:spTree>
+    <p:extLst>
+      <p:ext uri="{BB962C8B-B14F-4D97-AF65-F5344CB8AC3E}">
+        <p14:creationId xmlns:p14="http://schemas.microsoft.com/office/powerpoint/2010/main" val="3674233272"/>
+      </p:ext>
+    </p:extLst>
   </p:cSld>
   <p:clrMap bg1="lt1" tx1="dk1" bg2="lt2" tx2="dk2" accent1="accent1" accent2="accent2" accent3="accent3" accent4="accent4" accent5="accent5" accent6="accent6" hlink="hlink" folHlink="folHlink"/>
   <p:sldLayoutIdLst>
@@ -2014,7 +2462,7 @@
                       <a:endParaRPr lang="en-US" sz="1200" dirty="0"/>
                     </a:p>
                   </a:txBody>
-                  <a:tcPr marL="36576" marR="18288" marT="45720" marB="45720">
+                  <a:tcPr marL="18288" marR="36576" marT="45720" marB="45720">
                     <a:lnL w="0" cap="flat" cmpd="sng" algn="ctr">
                       <a:noFill/>
                     </a:lnL>
@@ -2048,7 +2496,7 @@
                       <a:endParaRPr lang="en-US" sz="1200" dirty="0"/>
                     </a:p>
                   </a:txBody>
-                  <a:tcPr marL="36576" marR="18288" marT="45720" marB="45720">
+                  <a:tcPr marL="18288" marR="36576" marT="45720" marB="45720">
                     <a:lnL w="0" cap="flat" cmpd="sng" algn="ctr">
                       <a:noFill/>
                     </a:lnL>
@@ -2082,7 +2530,7 @@
                       <a:endParaRPr lang="en-US" sz="1200" dirty="0"/>
                     </a:p>
                   </a:txBody>
-                  <a:tcPr marL="36576" marR="18288" marT="45720" marB="45720">
+                  <a:tcPr marL="18288" marR="36576" marT="45720" marB="45720">
                     <a:lnL w="0" cap="flat" cmpd="sng" algn="ctr">
                       <a:noFill/>
                     </a:lnL>
@@ -2118,7 +2566,7 @@
                       <a:endParaRPr lang="en-US" sz="1200" dirty="0"/>
                     </a:p>
                   </a:txBody>
-                  <a:tcPr marL="36576" marR="18288" marT="45720" marB="45720">
+                  <a:tcPr marL="18288" marR="36576" marT="45720" marB="45720">
                     <a:lnL w="0" cap="flat" cmpd="sng" algn="ctr">
                       <a:noFill/>
                     </a:lnL>
@@ -2152,7 +2600,7 @@
                       <a:endParaRPr lang="en-US" sz="1200" dirty="0"/>
                     </a:p>
                   </a:txBody>
-                  <a:tcPr marL="36576" marR="18288" marT="45720" marB="45720">
+                  <a:tcPr marL="18288" marR="36576" marT="45720" marB="45720">
                     <a:lnL w="0" cap="flat" cmpd="sng" algn="ctr">
                       <a:noFill/>
                     </a:lnL>
@@ -2186,7 +2634,7 @@
                       <a:endParaRPr lang="en-US" sz="1200" dirty="0"/>
                     </a:p>
                   </a:txBody>
-                  <a:tcPr marL="36576" marR="18288" marT="45720" marB="45720">
+                  <a:tcPr marL="18288" marR="36576" marT="45720" marB="45720">
                     <a:lnL w="0" cap="flat" cmpd="sng" algn="ctr">
                       <a:noFill/>
                     </a:lnL>
@@ -2222,7 +2670,7 @@
                       <a:endParaRPr lang="en-US" sz="1200" dirty="0"/>
                     </a:p>
                   </a:txBody>
-                  <a:tcPr marL="36576" marR="18288" marT="45720" marB="45720">
+                  <a:tcPr marL="18288" marR="36576" marT="45720" marB="45720">
                     <a:lnL w="0" cap="flat" cmpd="sng" algn="ctr">
                       <a:noFill/>
                     </a:lnL>
@@ -2256,7 +2704,7 @@
                       <a:endParaRPr lang="en-US" sz="1200" dirty="0"/>
                     </a:p>
                   </a:txBody>
-                  <a:tcPr marL="36576" marR="18288" marT="45720" marB="45720">
+                  <a:tcPr marL="18288" marR="36576" marT="45720" marB="45720">
                     <a:lnL w="0" cap="flat" cmpd="sng" algn="ctr">
                       <a:noFill/>
                     </a:lnL>
@@ -2290,7 +2738,7 @@
                       <a:endParaRPr lang="en-US" sz="1200" dirty="0"/>
                     </a:p>
                   </a:txBody>
-                  <a:tcPr marL="36576" marR="18288" marT="45720" marB="45720">
+                  <a:tcPr marL="18288" marR="36576" marT="45720" marB="45720">
                     <a:lnL w="0" cap="flat" cmpd="sng" algn="ctr">
                       <a:noFill/>
                     </a:lnL>

</xml_diff>

<commit_message>
v.1.0.4: Fixed slide layout generation
- slideLayout1.xml (idx=0) is now hardcoded as 'Content - no subtitle'
  with zero inset margins (lIns=0 tIns=0 rIns=0 bIns=0)
- All subsequent layouts (idx > 0) use dynamic generation with their
  own names from defineSlideMaster()
- This ensures first layout always has the custom S-P Global template
  while allowing users to define additional custom layouts
</commit_message>
<xml_diff>
--- a/node-test-output.pptx
+++ b/node-test-output.pptx
@@ -2,7 +2,7 @@
 <file path=ppt/presentation.xml><?xml version="1.0" encoding="utf-8"?>
 <p:presentation xmlns:a="http://schemas.openxmlformats.org/drawingml/2006/main" xmlns:r="http://schemas.openxmlformats.org/officeDocument/2006/relationships" xmlns:p="http://schemas.openxmlformats.org/presentationml/2006/main" saveSubsetFonts="1" autoCompressPictures="0">
   <p:sldMasterIdLst>
-    <p:sldMasterId id="2147483757" r:id="rId1"/>
+    <p:sldMasterId id="2147483648" r:id="rId1"/>
   </p:sldMasterIdLst>
   <p:sldIdLst>
     <p:sldId id="256" r:id="rId2"/>
@@ -1492,11 +1492,6 @@
 <file path=ppt/slideMasters/slideMaster1.xml><?xml version="1.0" encoding="utf-8"?>
 <p:sldMaster xmlns:a="http://schemas.openxmlformats.org/drawingml/2006/main" xmlns:r="http://schemas.openxmlformats.org/officeDocument/2006/relationships" xmlns:p="http://schemas.openxmlformats.org/presentationml/2006/main">
   <p:cSld>
-    <p:bg>
-      <p:bgRef idx="1001">
-        <a:schemeClr val="bg1"/>
-      </p:bgRef>
-    </p:bg>
     <p:spTree>
       <p:nvGrpSpPr>
         <p:cNvPr id="1" name=""/>
@@ -1511,226 +1506,7 @@
           <a:chExt cx="0" cy="0"/>
         </a:xfrm>
       </p:grpSpPr>
-      <p:sp>
-        <p:nvSpPr>
-          <p:cNvPr id="2" name="Footer Placeholder 1">
-            <a:extLst>
-              <a:ext uri="{FF2B5EF4-FFF2-40B4-BE49-F238E27FC236}">
-                <a16:creationId xmlns:a16="http://schemas.microsoft.com/office/drawing/2014/main" id="{DA160B2F-9375-4DE3-A5A0-161BE0A64385}"/>
-              </a:ext>
-            </a:extLst>
-          </p:cNvPr>
-          <p:cNvSpPr>
-            <a:spLocks noGrp="1"/>
-          </p:cNvSpPr>
-          <p:nvPr>
-            <p:ph type="ftr" sz="quarter" idx="3"/>
-          </p:nvPr>
-        </p:nvSpPr>
-        <p:spPr>
-          <a:xfrm>
-            <a:off x="6096000" y="0"/>
-            <a:ext cx="5535279" cy="317674"/>
-          </a:xfrm>
-          <a:prstGeom prst="rect">
-            <a:avLst/>
-          </a:prstGeom>
-        </p:spPr>
-        <p:txBody>
-          <a:bodyPr vert="horz" wrap="none" lIns="0" tIns="0" rIns="0" bIns="0" rtlCol="0" anchor="ctr"/>
-          <a:lstStyle>
-            <a:lvl1pPr algn="r">
-              <a:defRPr sz="900">
-                <a:solidFill>
-                  <a:schemeClr val="tx1"/>
-                </a:solidFill>
-              </a:defRPr>
-            </a:lvl1pPr>
-          </a:lstStyle>
-          <a:p>
-            <a:r>
-              <a:rPr lang="en-US"/>
-              <a:t>Section name (optional) / Title / Month 20YY</a:t>
-            </a:r>
-          </a:p>
-        </p:txBody>
-      </p:sp>
-      <p:sp>
-        <p:nvSpPr>
-          <p:cNvPr id="6" name="Slide Number Placeholder 5"/>
-          <p:cNvSpPr>
-            <a:spLocks noGrp="1"/>
-          </p:cNvSpPr>
-          <p:nvPr userDrawn="1">
-            <p:ph type="sldNum" sz="quarter" idx="4"/>
-          </p:nvPr>
-        </p:nvSpPr>
-        <p:spPr>
-          <a:xfrm>
-            <a:off x="11320251" y="6563709"/>
-            <a:ext cx="311576" cy="214804"/>
-          </a:xfrm>
-          <a:prstGeom prst="rect">
-            <a:avLst/>
-          </a:prstGeom>
-        </p:spPr>
-        <p:txBody>
-          <a:bodyPr vert="horz" lIns="0" tIns="0" rIns="0" bIns="0" rtlCol="0" anchor="ctr"/>
-          <a:lstStyle>
-            <a:lvl1pPr algn="r">
-              <a:defRPr sz="700">
-                <a:solidFill>
-                  <a:schemeClr val="tx1"/>
-                </a:solidFill>
-              </a:defRPr>
-            </a:lvl1pPr>
-          </a:lstStyle>
-          <a:p>
-            <a:fld id="{5CFA18E4-D58E-4B28-B105-28D9665A8EBC}" type="slidenum">
-              <a:rPr lang="en-US" smtClean="0"/>
-              <a:pPr/>
-              <a:t>‹#›</a:t>
-            </a:fld>
-            <a:endParaRPr lang="en-US"/>
-          </a:p>
-        </p:txBody>
-      </p:sp>
-      <p:sp>
-        <p:nvSpPr>
-          <p:cNvPr id="88" name="Title Placeholder 1">
-            <a:extLst>
-              <a:ext uri="{FF2B5EF4-FFF2-40B4-BE49-F238E27FC236}">
-                <a16:creationId xmlns:a16="http://schemas.microsoft.com/office/drawing/2014/main" id="{92E3486A-297A-4953-BF79-0AEFDE6C9C3F}"/>
-              </a:ext>
-            </a:extLst>
-          </p:cNvPr>
-          <p:cNvSpPr>
-            <a:spLocks noGrp="1"/>
-          </p:cNvSpPr>
-          <p:nvPr userDrawn="1">
-            <p:ph type="title"/>
-          </p:nvPr>
-        </p:nvSpPr>
-        <p:spPr>
-          <a:xfrm>
-            <a:off x="567039" y="323644"/>
-            <a:ext cx="11062709" cy="845439"/>
-          </a:xfrm>
-          <a:prstGeom prst="rect">
-            <a:avLst/>
-          </a:prstGeom>
-        </p:spPr>
-        <p:txBody>
-          <a:bodyPr vert="horz" lIns="0" tIns="0" rIns="0" bIns="0" rtlCol="0" anchor="t">
-            <a:noAutofit/>
-          </a:bodyPr>
-          <a:lstStyle/>
-          <a:p>
-            <a:r>
-              <a:rPr lang="en-US"/>
-              <a:t>Click to edit Master title style</a:t>
-            </a:r>
-          </a:p>
-        </p:txBody>
-      </p:sp>
-      <p:sp>
-        <p:nvSpPr>
-          <p:cNvPr id="27" name="Text Placeholder 2">
-            <a:extLst>
-              <a:ext uri="{FF2B5EF4-FFF2-40B4-BE49-F238E27FC236}">
-                <a16:creationId xmlns:a16="http://schemas.microsoft.com/office/drawing/2014/main" id="{F08B5A9E-5A85-46D7-B45C-7C4E83238E02}"/>
-              </a:ext>
-            </a:extLst>
-          </p:cNvPr>
-          <p:cNvSpPr>
-            <a:spLocks noGrp="1"/>
-          </p:cNvSpPr>
-          <p:nvPr userDrawn="1">
-            <p:ph type="body" idx="1"/>
-          </p:nvPr>
-        </p:nvSpPr>
-        <p:spPr>
-          <a:xfrm>
-            <a:off x="567039" y="1289097"/>
-            <a:ext cx="11064240" cy="4261397"/>
-          </a:xfrm>
-          <a:prstGeom prst="rect">
-            <a:avLst/>
-          </a:prstGeom>
-        </p:spPr>
-        <p:txBody>
-          <a:bodyPr vert="horz" lIns="0" tIns="0" rIns="0" bIns="0" rtlCol="0">
-            <a:noAutofit/>
-          </a:bodyPr>
-          <a:lstStyle/>
-          <a:p>
-            <a:pPr lvl="0"/>
-            <a:r>
-              <a:rPr lang="en-US"/>
-              <a:t>Click to edit Master text styles</a:t>
-            </a:r>
-          </a:p>
-          <a:p>
-            <a:pPr lvl="1"/>
-            <a:r>
-              <a:rPr lang="en-US"/>
-              <a:t>Second level</a:t>
-            </a:r>
-          </a:p>
-          <a:p>
-            <a:pPr lvl="2"/>
-            <a:r>
-              <a:rPr lang="en-US"/>
-              <a:t>Third level</a:t>
-            </a:r>
-          </a:p>
-          <a:p>
-            <a:pPr lvl="3"/>
-            <a:r>
-              <a:rPr lang="en-US"/>
-              <a:t>Fourth level</a:t>
-            </a:r>
-          </a:p>
-          <a:p>
-            <a:pPr lvl="4"/>
-            <a:r>
-              <a:rPr lang="en-US"/>
-              <a:t>Fifth level</a:t>
-            </a:r>
-          </a:p>
-        </p:txBody>
-      </p:sp>
-      <p:sp>
-        <p:nvSpPr>
-          <p:cNvPr id="80" name="Rectangle 79">
-            <a:extLst>
-              <a:ext uri="{FF2B5EF4-FFF2-40B4-BE49-F238E27FC236}">
-                <a16:creationId xmlns:a16="http://schemas.microsoft.com/office/drawing/2014/main" id="{1284AB22-BA66-47B9-8BEB-416F2BFF4706}"/>
-              </a:ext>
-              <a:ext uri="{C183D7F6-B498-43B3-948B-1728B52AA6E4}">
-                <adec:decorative xmlns:adec="http://schemas.microsoft.com/office/drawing/2017/decorative" val="0"/>
-              </a:ext>
-            </a:extLst>
-          </p:cNvPr>
-          <p:cNvSpPr/>
-          <p:nvPr userDrawn="1"/>
-        </p:nvSpPr>
-        <p:spPr>
-          <a:xfrm>
-            <a:off x="5272088" y="6575649"/>
-            <a:ext cx="6129126" cy="200055"/>
-          </a:xfrm>
-          <a:prstGeom prst="rect">
-            <a:avLst/>
-          </a:prstGeom>
-        </p:spPr>
-      </p:sp>
     </p:spTree>
-    <p:extLst>
-      <p:ext uri="{BB962C8B-B14F-4D97-AF65-F5344CB8AC3E}">
-        <p14:creationId xmlns:p14="http://schemas.microsoft.com/office/powerpoint/2010/main" val="3674233272"/>
-      </p:ext>
-    </p:extLst>
   </p:cSld>
   <p:clrMap bg1="lt1" tx1="dk1" bg2="lt2" tx2="dk2" accent1="accent1" accent2="accent2" accent3="accent3" accent4="accent4" accent5="accent5" accent6="accent6" hlink="hlink" folHlink="folHlink"/>
   <p:sldLayoutIdLst>
@@ -2462,7 +2238,7 @@
                       <a:endParaRPr lang="en-US" sz="1200" dirty="0"/>
                     </a:p>
                   </a:txBody>
-                  <a:tcPr marL="18288" marR="36576" marT="45720" marB="45720">
+                  <a:tcPr marL="36576" marR="18288" marT="45720" marB="45720">
                     <a:lnL w="0" cap="flat" cmpd="sng" algn="ctr">
                       <a:noFill/>
                     </a:lnL>
@@ -2496,7 +2272,7 @@
                       <a:endParaRPr lang="en-US" sz="1200" dirty="0"/>
                     </a:p>
                   </a:txBody>
-                  <a:tcPr marL="18288" marR="36576" marT="45720" marB="45720">
+                  <a:tcPr marL="36576" marR="18288" marT="45720" marB="45720">
                     <a:lnL w="0" cap="flat" cmpd="sng" algn="ctr">
                       <a:noFill/>
                     </a:lnL>
@@ -2530,7 +2306,7 @@
                       <a:endParaRPr lang="en-US" sz="1200" dirty="0"/>
                     </a:p>
                   </a:txBody>
-                  <a:tcPr marL="18288" marR="36576" marT="45720" marB="45720">
+                  <a:tcPr marL="36576" marR="18288" marT="45720" marB="45720">
                     <a:lnL w="0" cap="flat" cmpd="sng" algn="ctr">
                       <a:noFill/>
                     </a:lnL>
@@ -2566,7 +2342,7 @@
                       <a:endParaRPr lang="en-US" sz="1200" dirty="0"/>
                     </a:p>
                   </a:txBody>
-                  <a:tcPr marL="18288" marR="36576" marT="45720" marB="45720">
+                  <a:tcPr marL="36576" marR="18288" marT="45720" marB="45720">
                     <a:lnL w="0" cap="flat" cmpd="sng" algn="ctr">
                       <a:noFill/>
                     </a:lnL>
@@ -2600,7 +2376,7 @@
                       <a:endParaRPr lang="en-US" sz="1200" dirty="0"/>
                     </a:p>
                   </a:txBody>
-                  <a:tcPr marL="18288" marR="36576" marT="45720" marB="45720">
+                  <a:tcPr marL="36576" marR="18288" marT="45720" marB="45720">
                     <a:lnL w="0" cap="flat" cmpd="sng" algn="ctr">
                       <a:noFill/>
                     </a:lnL>
@@ -2634,7 +2410,7 @@
                       <a:endParaRPr lang="en-US" sz="1200" dirty="0"/>
                     </a:p>
                   </a:txBody>
-                  <a:tcPr marL="18288" marR="36576" marT="45720" marB="45720">
+                  <a:tcPr marL="36576" marR="18288" marT="45720" marB="45720">
                     <a:lnL w="0" cap="flat" cmpd="sng" algn="ctr">
                       <a:noFill/>
                     </a:lnL>
@@ -2670,7 +2446,7 @@
                       <a:endParaRPr lang="en-US" sz="1200" dirty="0"/>
                     </a:p>
                   </a:txBody>
-                  <a:tcPr marL="18288" marR="36576" marT="45720" marB="45720">
+                  <a:tcPr marL="36576" marR="18288" marT="45720" marB="45720">
                     <a:lnL w="0" cap="flat" cmpd="sng" algn="ctr">
                       <a:noFill/>
                     </a:lnL>
@@ -2704,7 +2480,7 @@
                       <a:endParaRPr lang="en-US" sz="1200" dirty="0"/>
                     </a:p>
                   </a:txBody>
-                  <a:tcPr marL="18288" marR="36576" marT="45720" marB="45720">
+                  <a:tcPr marL="36576" marR="18288" marT="45720" marB="45720">
                     <a:lnL w="0" cap="flat" cmpd="sng" algn="ctr">
                       <a:noFill/>
                     </a:lnL>
@@ -2738,7 +2514,7 @@
                       <a:endParaRPr lang="en-US" sz="1200" dirty="0"/>
                     </a:p>
                   </a:txBody>
-                  <a:tcPr marL="18288" marR="36576" marT="45720" marB="45720">
+                  <a:tcPr marL="36576" marR="18288" marT="45720" marB="45720">
                     <a:lnL w="0" cap="flat" cmpd="sng" algn="ctr">
                       <a:noFill/>
                     </a:lnL>

</xml_diff>

<commit_message>
v.1.0.5: Empty slideLayouts array - user defines all layouts via defineSlideMaster()
</commit_message>
<xml_diff>
--- a/node-test-output.pptx
+++ b/node-test-output.pptx
@@ -1235,36 +1235,6 @@
 </p:notes>
 </file>
 
-<file path=ppt/slideLayouts/slideLayout1.xml><?xml version="1.0" encoding="utf-8"?>
-<p:sldLayout xmlns:a="http://schemas.openxmlformats.org/drawingml/2006/main" xmlns:r="http://schemas.openxmlformats.org/officeDocument/2006/relationships" xmlns:p="http://schemas.openxmlformats.org/presentationml/2006/main" preserve="1">
-  <p:cSld name="S-P Global EDP 2026 16-9">
-    <p:bg>
-      <p:bgRef idx="1001">
-        <a:schemeClr val="bg1"/>
-      </p:bgRef>
-    </p:bg>
-    <p:spTree>
-      <p:nvGrpSpPr>
-        <p:cNvPr id="1" name=""/>
-        <p:cNvGrpSpPr/>
-        <p:nvPr/>
-      </p:nvGrpSpPr>
-      <p:grpSpPr>
-        <a:xfrm>
-          <a:off x="0" y="0"/>
-          <a:ext cx="0" cy="0"/>
-          <a:chOff x="0" y="0"/>
-          <a:chExt cx="0" cy="0"/>
-        </a:xfrm>
-      </p:grpSpPr>
-    </p:spTree>
-  </p:cSld>
-  <p:clrMapOvr>
-    <a:masterClrMapping/>
-  </p:clrMapOvr>
-</p:sldLayout>
-</file>
-
 <file path=ppt/slideMasters/slideMaster1.xml><?xml version="1.0" encoding="utf-8"?>
 <p:sldMaster xmlns:a="http://schemas.openxmlformats.org/drawingml/2006/main" xmlns:r="http://schemas.openxmlformats.org/officeDocument/2006/relationships" xmlns:p="http://schemas.openxmlformats.org/presentationml/2006/main">
   <p:cSld>
@@ -1285,9 +1255,7 @@
     </p:spTree>
   </p:cSld>
   <p:clrMap bg1="lt1" tx1="dk1" bg2="lt2" tx2="dk2" accent1="accent1" accent2="accent2" accent3="accent3" accent4="accent4" accent5="accent5" accent6="accent6" hlink="hlink" folHlink="folHlink"/>
-  <p:sldLayoutIdLst>
-    <p:sldLayoutId id="2147483649" r:id="rId1"/>
-  </p:sldLayoutIdLst>
+  <p:sldLayoutIdLst/>
   <p:hf hdr="0" ftr="0" dt="0"/>
   <p:txStyles>
     <p:titleStyle>
@@ -2014,7 +1982,7 @@
                       <a:endParaRPr lang="en-US" sz="1200" dirty="0"/>
                     </a:p>
                   </a:txBody>
-                  <a:tcPr marL="36576" marR="18288" marT="45720" marB="45720">
+                  <a:tcPr marL="18288" marR="36576" marT="45720" marB="45720">
                     <a:lnL w="0" cap="flat" cmpd="sng" algn="ctr">
                       <a:noFill/>
                     </a:lnL>
@@ -2048,7 +2016,7 @@
                       <a:endParaRPr lang="en-US" sz="1200" dirty="0"/>
                     </a:p>
                   </a:txBody>
-                  <a:tcPr marL="36576" marR="18288" marT="45720" marB="45720">
+                  <a:tcPr marL="18288" marR="36576" marT="45720" marB="45720">
                     <a:lnL w="0" cap="flat" cmpd="sng" algn="ctr">
                       <a:noFill/>
                     </a:lnL>
@@ -2082,7 +2050,7 @@
                       <a:endParaRPr lang="en-US" sz="1200" dirty="0"/>
                     </a:p>
                   </a:txBody>
-                  <a:tcPr marL="36576" marR="18288" marT="45720" marB="45720">
+                  <a:tcPr marL="18288" marR="36576" marT="45720" marB="45720">
                     <a:lnL w="0" cap="flat" cmpd="sng" algn="ctr">
                       <a:noFill/>
                     </a:lnL>
@@ -2118,7 +2086,7 @@
                       <a:endParaRPr lang="en-US" sz="1200" dirty="0"/>
                     </a:p>
                   </a:txBody>
-                  <a:tcPr marL="36576" marR="18288" marT="45720" marB="45720">
+                  <a:tcPr marL="18288" marR="36576" marT="45720" marB="45720">
                     <a:lnL w="0" cap="flat" cmpd="sng" algn="ctr">
                       <a:noFill/>
                     </a:lnL>
@@ -2152,7 +2120,7 @@
                       <a:endParaRPr lang="en-US" sz="1200" dirty="0"/>
                     </a:p>
                   </a:txBody>
-                  <a:tcPr marL="36576" marR="18288" marT="45720" marB="45720">
+                  <a:tcPr marL="18288" marR="36576" marT="45720" marB="45720">
                     <a:lnL w="0" cap="flat" cmpd="sng" algn="ctr">
                       <a:noFill/>
                     </a:lnL>
@@ -2186,7 +2154,7 @@
                       <a:endParaRPr lang="en-US" sz="1200" dirty="0"/>
                     </a:p>
                   </a:txBody>
-                  <a:tcPr marL="36576" marR="18288" marT="45720" marB="45720">
+                  <a:tcPr marL="18288" marR="36576" marT="45720" marB="45720">
                     <a:lnL w="0" cap="flat" cmpd="sng" algn="ctr">
                       <a:noFill/>
                     </a:lnL>
@@ -2222,7 +2190,7 @@
                       <a:endParaRPr lang="en-US" sz="1200" dirty="0"/>
                     </a:p>
                   </a:txBody>
-                  <a:tcPr marL="36576" marR="18288" marT="45720" marB="45720">
+                  <a:tcPr marL="18288" marR="36576" marT="45720" marB="45720">
                     <a:lnL w="0" cap="flat" cmpd="sng" algn="ctr">
                       <a:noFill/>
                     </a:lnL>
@@ -2256,7 +2224,7 @@
                       <a:endParaRPr lang="en-US" sz="1200" dirty="0"/>
                     </a:p>
                   </a:txBody>
-                  <a:tcPr marL="36576" marR="18288" marT="45720" marB="45720">
+                  <a:tcPr marL="18288" marR="36576" marT="45720" marB="45720">
                     <a:lnL w="0" cap="flat" cmpd="sng" algn="ctr">
                       <a:noFill/>
                     </a:lnL>
@@ -2290,7 +2258,7 @@
                       <a:endParaRPr lang="en-US" sz="1200" dirty="0"/>
                     </a:p>
                   </a:txBody>
-                  <a:tcPr marL="36576" marR="18288" marT="45720" marB="45720">
+                  <a:tcPr marL="18288" marR="36576" marT="45720" marB="45720">
                     <a:lnL w="0" cap="flat" cmpd="sng" algn="ctr">
                       <a:noFill/>
                     </a:lnL>

</xml_diff>

<commit_message>
v.1.0.6: Hardcoded slide master XML with S-P Global EDP 2026 placeholders (footer, slide number, title, body, copyright, logo)
</commit_message>
<xml_diff>
--- a/node-test-output.pptx
+++ b/node-test-output.pptx
@@ -1238,6 +1238,11 @@
 <file path=ppt/slideMasters/slideMaster1.xml><?xml version="1.0" encoding="utf-8"?>
 <p:sldMaster xmlns:a="http://schemas.openxmlformats.org/drawingml/2006/main" xmlns:r="http://schemas.openxmlformats.org/officeDocument/2006/relationships" xmlns:p="http://schemas.openxmlformats.org/presentationml/2006/main">
   <p:cSld>
+    <p:bg>
+      <p:bgRef idx="1001">
+        <a:schemeClr val="bg1"/>
+      </p:bgRef>
+    </p:bg>
     <p:spTree>
       <p:nvGrpSpPr>
         <p:cNvPr id="1" name=""/>
@@ -1252,7 +1257,277 @@
           <a:chExt cx="0" cy="0"/>
         </a:xfrm>
       </p:grpSpPr>
+      <p:sp>
+        <p:nvSpPr>
+          <p:cNvPr id="2" name="Footer Placeholder 1">
+            <a:extLst>
+              <a:ext uri="{FF2B5EF4-FFF2-40B4-BE49-F238E27FC236}">
+                <a16:creationId xmlns:a16="http://schemas.microsoft.com/office/drawing/2014/main" id="{DA160B2F-9375-4DE3-A5A0-161BE0A64385}"/>
+              </a:ext>
+            </a:extLst>
+          </p:cNvPr>
+          <p:cNvSpPr>
+            <a:spLocks noGrp="1"/>
+          </p:cNvSpPr>
+          <p:nvPr>
+            <p:ph type="ftr" sz="quarter" idx="3"/>
+          </p:nvPr>
+        </p:nvSpPr>
+        <p:spPr>
+          <a:xfrm>
+            <a:off x="6096000" y="0"/>
+            <a:ext cx="5535279" cy="317674"/>
+          </a:xfrm>
+          <a:prstGeom prst="rect">
+            <a:avLst/>
+          </a:prstGeom>
+        </p:spPr>
+        <p:txBody>
+          <a:bodyPr vert="horz" wrap="none" lIns="0" tIns="0" rIns="0" bIns="0" rtlCol="0" anchor="ctr"/>
+          <a:lstStyle>
+            <a:lvl1pPr algn="r">
+              <a:defRPr sz="900">
+                <a:solidFill>
+                  <a:schemeClr val="tx1"/>
+                </a:solidFill>
+              </a:defRPr>
+            </a:lvl1pPr>
+          </a:lstStyle>
+          <a:p>
+            <a:r>
+              <a:rPr lang="en-US"/>
+              <a:t>Section name (optional) / Title / Month 20YY</a:t>
+            </a:r>
+          </a:p>
+        </p:txBody>
+      </p:sp>
+      <p:sp>
+        <p:nvSpPr>
+          <p:cNvPr id="6" name="Slide Number Placeholder 5"/>
+          <p:cNvSpPr>
+            <a:spLocks noGrp="1"/>
+          </p:cNvSpPr>
+          <p:nvPr userDrawn="1">
+            <p:ph type="sldNum" sz="quarter" idx="4"/>
+          </p:nvPr>
+        </p:nvSpPr>
+        <p:spPr>
+          <a:xfrm>
+            <a:off x="11320251" y="6563709"/>
+            <a:ext cx="311576" cy="214804"/>
+          </a:xfrm>
+          <a:prstGeom prst="rect">
+            <a:avLst/>
+          </a:prstGeom>
+        </p:spPr>
+        <p:txBody>
+          <a:bodyPr vert="horz" lIns="0" tIns="0" rIns="0" bIns="0" rtlCol="0" anchor="ctr"/>
+          <a:lstStyle>
+            <a:lvl1pPr algn="r">
+              <a:defRPr sz="700">
+                <a:solidFill>
+                  <a:schemeClr val="tx1"/>
+                </a:solidFill>
+              </a:defRPr>
+            </a:lvl1pPr>
+          </a:lstStyle>
+          <a:p>
+            <a:fld id="{5CFA18E4-D58E-4B28-B105-28D9665A8EBC}" type="slidenum">
+              <a:rPr lang="en-US" smtClean="0"/>
+              <a:pPr/>
+              <a:t>‹#›</a:t>
+            </a:fld>
+            <a:endParaRPr lang="en-US"/>
+          </a:p>
+        </p:txBody>
+      </p:sp>
+      <p:sp>
+        <p:nvSpPr>
+          <p:cNvPr id="88" name="Title Placeholder 1">
+            <a:extLst>
+              <a:ext uri="{FF2B5EF4-FFF2-40B4-BE49-F238E27FC236}">
+                <a16:creationId xmlns:a16="http://schemas.microsoft.com/office/drawing/2014/main" id="{92E3486A-297A-4953-BF79-0AEFDE6C9C3F}"/>
+              </a:ext>
+            </a:extLst>
+          </p:cNvPr>
+          <p:cNvSpPr>
+            <a:spLocks noGrp="1"/>
+          </p:cNvSpPr>
+          <p:nvPr userDrawn="1">
+            <p:ph type="title"/>
+          </p:nvPr>
+        </p:nvSpPr>
+        <p:spPr>
+          <a:xfrm>
+            <a:off x="567039" y="323644"/>
+            <a:ext cx="11062709" cy="845439"/>
+          </a:xfrm>
+          <a:prstGeom prst="rect">
+            <a:avLst/>
+          </a:prstGeom>
+        </p:spPr>
+        <p:txBody>
+          <a:bodyPr vert="horz" lIns="0" tIns="0" rIns="0" bIns="0" rtlCol="0" anchor="t">
+            <a:noAutofit/>
+          </a:bodyPr>
+          <a:lstStyle/>
+          <a:p>
+            <a:r>
+              <a:rPr lang="en-US"/>
+              <a:t>Click to edit Master title style</a:t>
+            </a:r>
+          </a:p>
+        </p:txBody>
+      </p:sp>
+      <p:sp>
+        <p:nvSpPr>
+          <p:cNvPr id="27" name="Text Placeholder 2">
+            <a:extLst>
+              <a:ext uri="{FF2B5EF4-FFF2-40B4-BE49-F238E27FC236}">
+                <a16:creationId xmlns:a16="http://schemas.microsoft.com/office/drawing/2014/main" id="{F08B5A9E-5A85-46D7-B45C-7C4E83238E02}"/>
+              </a:ext>
+            </a:extLst>
+          </p:cNvPr>
+          <p:cNvSpPr>
+            <a:spLocks noGrp="1"/>
+          </p:cNvSpPr>
+          <p:nvPr userDrawn="1">
+            <p:ph type="body" idx="1"/>
+          </p:nvPr>
+        </p:nvSpPr>
+        <p:spPr>
+          <a:xfrm>
+            <a:off x="567039" y="1289097"/>
+            <a:ext cx="11064240" cy="4261397"/>
+          </a:xfrm>
+          <a:prstGeom prst="rect">
+            <a:avLst/>
+          </a:prstGeom>
+        </p:spPr>
+        <p:txBody>
+          <a:bodyPr vert="horz" lIns="0" tIns="0" rIns="0" bIns="0" rtlCol="0">
+            <a:noAutofit/>
+          </a:bodyPr>
+          <a:lstStyle/>
+          <a:p>
+            <a:pPr lvl="0"/>
+            <a:r>
+              <a:rPr lang="en-US"/>
+              <a:t>Click to edit Master text styles</a:t>
+            </a:r>
+          </a:p>
+          <a:p>
+            <a:pPr lvl="1"/>
+            <a:r>
+              <a:rPr lang="en-US"/>
+              <a:t>Second level</a:t>
+            </a:r>
+          </a:p>
+          <a:p>
+            <a:pPr lvl="2"/>
+            <a:r>
+              <a:rPr lang="en-US"/>
+              <a:t>Third level</a:t>
+            </a:r>
+          </a:p>
+          <a:p>
+            <a:pPr lvl="3"/>
+            <a:r>
+              <a:rPr lang="en-US"/>
+              <a:t>Fourth level</a:t>
+            </a:r>
+          </a:p>
+          <a:p>
+            <a:pPr lvl="4"/>
+            <a:r>
+              <a:rPr lang="en-US"/>
+              <a:t>Fifth level</a:t>
+            </a:r>
+          </a:p>
+        </p:txBody>
+      </p:sp>
+      <p:sp>
+        <p:nvSpPr>
+          <p:cNvPr id="80" name="Rectangle 79">
+            <a:extLst>
+              <a:ext uri="{FF2B5EF4-FFF2-40B4-BE49-F238E27FC236}">
+                <a16:creationId xmlns:a16="http://schemas.microsoft.com/office/drawing/2014/main" id="{1284AB22-BA66-47B9-8BEB-416F2BFF4706}"/>
+              </a:ext>
+              <a:ext uri="{C183D7F6-B498-43B3-948B-1728B52AA6E4}">
+                <adec:decorative xmlns:adec="http://schemas.microsoft.com/office/drawing/2017/decorative" val="0"/>
+              </a:ext>
+            </a:extLst>
+          </p:cNvPr>
+          <p:cNvSpPr/>
+          <p:nvPr userDrawn="1"/>
+        </p:nvSpPr>
+        <p:spPr>
+          <a:xfrm>
+            <a:off x="5272088" y="6575649"/>
+            <a:ext cx="6129126" cy="200055"/>
+          </a:xfrm>
+          <a:prstGeom prst="rect">
+            <a:avLst/>
+          </a:prstGeom>
+        </p:spPr>
+        <p:txBody>
+          <a:bodyPr wrap="square" anchor="b">
+            <a:spAutoFit/>
+          </a:bodyPr>
+          <a:lstStyle/>
+          <a:p>
+            <a:pPr algn="r"/>
+            <a:r>
+              <a:rPr lang="en-US" sz="700">
+                <a:latin typeface="+mn-lt"/>
+              </a:rPr>
+              <a:t>© 2026 S&amp;P Global.</a:t>
+            </a:r>
+          </a:p>
+        </p:txBody>
+      </p:sp>
+      <p:pic>
+        <p:nvPicPr>
+          <p:cNvPr id="4" name="Picture 3" descr="A black background with red text&#10;&#10;AI-generated content may be incorrect.">
+            <a:extLst>
+              <a:ext uri="{FF2B5EF4-FFF2-40B4-BE49-F238E27FC236}">
+                <a16:creationId xmlns:a16="http://schemas.microsoft.com/office/drawing/2014/main" id="{49457A2A-D157-577A-4E4D-803696EF5118}"/>
+              </a:ext>
+            </a:extLst>
+          </p:cNvPr>
+          <p:cNvPicPr>
+            <a:picLocks noChangeAspect="1"/>
+          </p:cNvPicPr>
+          <p:nvPr userDrawn="1"/>
+        </p:nvPicPr>
+        <p:blipFill>
+          <a:blip r:embed="rId67">
+            <a:extLst>
+              <a:ext uri="{28A0092B-C50C-407E-A947-70E740481C1C}">
+                <a14:useLocalDpi xmlns:a14="http://schemas.microsoft.com/office/drawing/2010/main" val="0"/>
+              </a:ext>
+            </a:extLst>
+          </a:blip>
+          <a:stretch>
+            <a:fillRect/>
+          </a:stretch>
+        </p:blipFill>
+        <p:spPr>
+          <a:xfrm>
+            <a:off x="567394" y="6396112"/>
+            <a:ext cx="762002" cy="365761"/>
+          </a:xfrm>
+          <a:prstGeom prst="rect">
+            <a:avLst/>
+          </a:prstGeom>
+        </p:spPr>
+      </p:pic>
     </p:spTree>
+    <p:extLst>
+      <p:ext uri="{BB962C8B-B14F-4D97-AF65-F5344CB8AC3E}">
+        <p14:creationId xmlns:p14="http://schemas.microsoft.com/office/powerpoint/2010/main" val="3674233272"/>
+      </p:ext>
+    </p:extLst>
   </p:cSld>
   <p:clrMap bg1="lt1" tx1="dk1" bg2="lt2" tx2="dk2" accent1="accent1" accent2="accent2" accent3="accent3" accent4="accent4" accent5="accent5" accent6="accent6" hlink="hlink" folHlink="folHlink"/>
   <p:sldLayoutIdLst/>

</xml_diff>

<commit_message>
v.1.0.6: Hardcoded slideMaster1.xml with S-P Global EDP 2026 branding (footer, slide number, title, body placeholders, copyright)
</commit_message>
<xml_diff>
--- a/node-test-output.pptx
+++ b/node-test-output.pptx
@@ -1486,42 +1486,6 @@
           </a:p>
         </p:txBody>
       </p:sp>
-      <p:pic>
-        <p:nvPicPr>
-          <p:cNvPr id="4" name="Picture 3" descr="A black background with red text&#10;&#10;AI-generated content may be incorrect.">
-            <a:extLst>
-              <a:ext uri="{FF2B5EF4-FFF2-40B4-BE49-F238E27FC236}">
-                <a16:creationId xmlns:a16="http://schemas.microsoft.com/office/drawing/2014/main" id="{49457A2A-D157-577A-4E4D-803696EF5118}"/>
-              </a:ext>
-            </a:extLst>
-          </p:cNvPr>
-          <p:cNvPicPr>
-            <a:picLocks noChangeAspect="1"/>
-          </p:cNvPicPr>
-          <p:nvPr userDrawn="1"/>
-        </p:nvPicPr>
-        <p:blipFill>
-          <a:blip r:embed="rId67">
-            <a:extLst>
-              <a:ext uri="{28A0092B-C50C-407E-A947-70E740481C1C}">
-                <a14:useLocalDpi xmlns:a14="http://schemas.microsoft.com/office/drawing/2010/main" val="0"/>
-              </a:ext>
-            </a:extLst>
-          </a:blip>
-          <a:stretch>
-            <a:fillRect/>
-          </a:stretch>
-        </p:blipFill>
-        <p:spPr>
-          <a:xfrm>
-            <a:off x="567394" y="6396112"/>
-            <a:ext cx="762002" cy="365761"/>
-          </a:xfrm>
-          <a:prstGeom prst="rect">
-            <a:avLst/>
-          </a:prstGeom>
-        </p:spPr>
-      </p:pic>
     </p:spTree>
     <p:extLst>
       <p:ext uri="{BB962C8B-B14F-4D97-AF65-F5344CB8AC3E}">

</xml_diff>

<commit_message>
v.1.0.8: User changes to gen-xml.ts
</commit_message>
<xml_diff>
--- a/node-test-output.pptx
+++ b/node-test-output.pptx
@@ -1442,46 +1442,6 @@
             <a:r>
               <a:rPr lang="en-US"/>
               <a:t>Fifth level</a:t>
-            </a:r>
-          </a:p>
-        </p:txBody>
-      </p:sp>
-      <p:sp>
-        <p:nvSpPr>
-          <p:cNvPr id="80" name="Rectangle 79">
-            <a:extLst>
-              <a:ext uri="{FF2B5EF4-FFF2-40B4-BE49-F238E27FC236}">
-                <a16:creationId xmlns:a16="http://schemas.microsoft.com/office/drawing/2014/main" id="{1284AB22-BA66-47B9-8BEB-416F2BFF4706}"/>
-              </a:ext>
-              <a:ext uri="{C183D7F6-B498-43B3-948B-1728B52AA6E4}">
-                <adec:decorative xmlns:adec="http://schemas.microsoft.com/office/drawing/2017/decorative" val="0"/>
-              </a:ext>
-            </a:extLst>
-          </p:cNvPr>
-          <p:cNvSpPr/>
-          <p:nvPr userDrawn="1"/>
-        </p:nvSpPr>
-        <p:spPr>
-          <a:xfrm>
-            <a:off x="5272088" y="6575649"/>
-            <a:ext cx="6129126" cy="200055"/>
-          </a:xfrm>
-          <a:prstGeom prst="rect">
-            <a:avLst/>
-          </a:prstGeom>
-        </p:spPr>
-        <p:txBody>
-          <a:bodyPr wrap="square" anchor="b">
-            <a:spAutoFit/>
-          </a:bodyPr>
-          <a:lstStyle/>
-          <a:p>
-            <a:pPr algn="r"/>
-            <a:r>
-              <a:rPr lang="en-US" sz="700">
-                <a:latin typeface="+mn-lt"/>
-              </a:rPr>
-              <a:t>© 2026 S&amp;P Global.</a:t>
             </a:r>
           </a:p>
         </p:txBody>

</xml_diff>